<commit_message>
Fixing presentation and confusion matrix
</commit_message>
<xml_diff>
--- a/slides/Presentation.pptx
+++ b/slides/Presentation.pptx
@@ -9417,10 +9417,10 @@
       </p:sp>
       <p:pic>
         <p:nvPicPr>
-          <p:cNvPr id="7" name="Picture 6" descr="Chart, treemap chart&#10;&#10;Description automatically generated">
+          <p:cNvPr id="9" name="Picture 8" descr="Chart, treemap chart&#10;&#10;Description automatically generated">
             <a:extLst>
               <a:ext uri="{FF2B5EF4-FFF2-40B4-BE49-F238E27FC236}">
-                <a16:creationId xmlns:a16="http://schemas.microsoft.com/office/drawing/2014/main" id="{B11231A3-7D33-947C-7156-C0100E6017D1}"/>
+                <a16:creationId xmlns:a16="http://schemas.microsoft.com/office/drawing/2014/main" id="{34F81D6E-F7C6-0455-63F6-9987FD3F397B}"/>
               </a:ext>
             </a:extLst>
           </p:cNvPr>
@@ -9437,8 +9437,8 @@
         </p:blipFill>
         <p:spPr>
           <a:xfrm>
-            <a:off x="4717964" y="1344706"/>
-            <a:ext cx="4625898" cy="4893580"/>
+            <a:off x="4405822" y="968188"/>
+            <a:ext cx="4897191" cy="5280212"/>
           </a:xfrm>
           <a:prstGeom prst="rect">
             <a:avLst/>
@@ -9561,96 +9561,6 @@
           </a:p>
         </p:txBody>
       </p:sp>
-      <p:pic>
-        <p:nvPicPr>
-          <p:cNvPr id="5" name="Picture 4" descr="Graphical user interface, text, application&#10;&#10;Description automatically generated">
-            <a:extLst>
-              <a:ext uri="{FF2B5EF4-FFF2-40B4-BE49-F238E27FC236}">
-                <a16:creationId xmlns:a16="http://schemas.microsoft.com/office/drawing/2014/main" id="{7B84B028-9281-9BDB-B1F4-6E7E25D0A829}"/>
-              </a:ext>
-            </a:extLst>
-          </p:cNvPr>
-          <p:cNvPicPr>
-            <a:picLocks noChangeAspect="1"/>
-          </p:cNvPicPr>
-          <p:nvPr/>
-        </p:nvPicPr>
-        <p:blipFill>
-          <a:blip r:embed="rId2"/>
-          <a:stretch>
-            <a:fillRect/>
-          </a:stretch>
-        </p:blipFill>
-        <p:spPr>
-          <a:xfrm>
-            <a:off x="842602" y="2208997"/>
-            <a:ext cx="3145935" cy="1053888"/>
-          </a:xfrm>
-          <a:prstGeom prst="rect">
-            <a:avLst/>
-          </a:prstGeom>
-        </p:spPr>
-      </p:pic>
-      <p:pic>
-        <p:nvPicPr>
-          <p:cNvPr id="9" name="Picture 8" descr="Chart, treemap chart&#10;&#10;Description automatically generated">
-            <a:extLst>
-              <a:ext uri="{FF2B5EF4-FFF2-40B4-BE49-F238E27FC236}">
-                <a16:creationId xmlns:a16="http://schemas.microsoft.com/office/drawing/2014/main" id="{543B3C6E-7BE4-7A27-A765-E5BAC841604E}"/>
-              </a:ext>
-            </a:extLst>
-          </p:cNvPr>
-          <p:cNvPicPr>
-            <a:picLocks noChangeAspect="1"/>
-          </p:cNvPicPr>
-          <p:nvPr/>
-        </p:nvPicPr>
-        <p:blipFill>
-          <a:blip r:embed="rId3"/>
-          <a:stretch>
-            <a:fillRect/>
-          </a:stretch>
-        </p:blipFill>
-        <p:spPr>
-          <a:xfrm>
-            <a:off x="5144794" y="2208997"/>
-            <a:ext cx="3690818" cy="3054151"/>
-          </a:xfrm>
-          <a:prstGeom prst="rect">
-            <a:avLst/>
-          </a:prstGeom>
-        </p:spPr>
-      </p:pic>
-      <p:pic>
-        <p:nvPicPr>
-          <p:cNvPr id="11" name="Picture 10" descr="Text&#10;&#10;Description automatically generated with low confidence">
-            <a:extLst>
-              <a:ext uri="{FF2B5EF4-FFF2-40B4-BE49-F238E27FC236}">
-                <a16:creationId xmlns:a16="http://schemas.microsoft.com/office/drawing/2014/main" id="{7D5282B0-7484-A82E-28CC-1D66D4E69BAC}"/>
-              </a:ext>
-            </a:extLst>
-          </p:cNvPr>
-          <p:cNvPicPr>
-            <a:picLocks noChangeAspect="1"/>
-          </p:cNvPicPr>
-          <p:nvPr/>
-        </p:nvPicPr>
-        <p:blipFill>
-          <a:blip r:embed="rId4"/>
-          <a:stretch>
-            <a:fillRect/>
-          </a:stretch>
-        </p:blipFill>
-        <p:spPr>
-          <a:xfrm>
-            <a:off x="491065" y="3595116"/>
-            <a:ext cx="4511241" cy="845856"/>
-          </a:xfrm>
-          <a:prstGeom prst="rect">
-            <a:avLst/>
-          </a:prstGeom>
-        </p:spPr>
-      </p:pic>
       <p:sp>
         <p:nvSpPr>
           <p:cNvPr id="12" name="Content Placeholder 2">
@@ -9908,19 +9818,101 @@
           <a:p>
             <a:r>
               <a:rPr lang="en-US" dirty="0"/>
-              <a:t>As we can see - most of our metrics have deteriorated </a:t>
+              <a:t>As we can see - all our metrics have deteriorated after using SMOTE, so it's better to use this dataset as is.</a:t>
             </a:r>
-            <a:r>
-              <a:rPr lang="en-US" sz="1900" dirty="0"/>
-              <a:t>after</a:t>
-            </a:r>
-            <a:r>
-              <a:rPr lang="en-US" dirty="0"/>
-              <a:t> using SMOTE, but prediction of the second value became better, so we can choose which option to use.</a:t>
-            </a:r>
           </a:p>
         </p:txBody>
       </p:sp>
+      <p:pic>
+        <p:nvPicPr>
+          <p:cNvPr id="15" name="Picture 14" descr="Chart, treemap chart&#10;&#10;Description automatically generated">
+            <a:extLst>
+              <a:ext uri="{FF2B5EF4-FFF2-40B4-BE49-F238E27FC236}">
+                <a16:creationId xmlns:a16="http://schemas.microsoft.com/office/drawing/2014/main" id="{BCA46915-D622-0AB2-F774-BD98E31F4274}"/>
+              </a:ext>
+            </a:extLst>
+          </p:cNvPr>
+          <p:cNvPicPr>
+            <a:picLocks noChangeAspect="1"/>
+          </p:cNvPicPr>
+          <p:nvPr/>
+        </p:nvPicPr>
+        <p:blipFill>
+          <a:blip r:embed="rId2"/>
+          <a:stretch>
+            <a:fillRect/>
+          </a:stretch>
+        </p:blipFill>
+        <p:spPr>
+          <a:xfrm>
+            <a:off x="5002305" y="1983352"/>
+            <a:ext cx="4231342" cy="3223527"/>
+          </a:xfrm>
+          <a:prstGeom prst="rect">
+            <a:avLst/>
+          </a:prstGeom>
+        </p:spPr>
+      </p:pic>
+      <p:pic>
+        <p:nvPicPr>
+          <p:cNvPr id="28" name="Picture 27" descr="Text&#10;&#10;Description automatically generated">
+            <a:extLst>
+              <a:ext uri="{FF2B5EF4-FFF2-40B4-BE49-F238E27FC236}">
+                <a16:creationId xmlns:a16="http://schemas.microsoft.com/office/drawing/2014/main" id="{203B4E08-034B-D41F-037F-F47779156D34}"/>
+              </a:ext>
+            </a:extLst>
+          </p:cNvPr>
+          <p:cNvPicPr>
+            <a:picLocks noChangeAspect="1"/>
+          </p:cNvPicPr>
+          <p:nvPr/>
+        </p:nvPicPr>
+        <p:blipFill>
+          <a:blip r:embed="rId3"/>
+          <a:stretch>
+            <a:fillRect/>
+          </a:stretch>
+        </p:blipFill>
+        <p:spPr>
+          <a:xfrm>
+            <a:off x="570831" y="3883669"/>
+            <a:ext cx="4762500" cy="774700"/>
+          </a:xfrm>
+          <a:prstGeom prst="rect">
+            <a:avLst/>
+          </a:prstGeom>
+        </p:spPr>
+      </p:pic>
+      <p:pic>
+        <p:nvPicPr>
+          <p:cNvPr id="30" name="Picture 29" descr="Graphical user interface, text, application&#10;&#10;Description automatically generated">
+            <a:extLst>
+              <a:ext uri="{FF2B5EF4-FFF2-40B4-BE49-F238E27FC236}">
+                <a16:creationId xmlns:a16="http://schemas.microsoft.com/office/drawing/2014/main" id="{A5DCD475-0A99-BCCD-D771-21A66953E03C}"/>
+              </a:ext>
+            </a:extLst>
+          </p:cNvPr>
+          <p:cNvPicPr>
+            <a:picLocks noChangeAspect="1"/>
+          </p:cNvPicPr>
+          <p:nvPr/>
+        </p:nvPicPr>
+        <p:blipFill>
+          <a:blip r:embed="rId4"/>
+          <a:stretch>
+            <a:fillRect/>
+          </a:stretch>
+        </p:blipFill>
+        <p:spPr>
+          <a:xfrm>
+            <a:off x="868579" y="2267128"/>
+            <a:ext cx="3505200" cy="1244600"/>
+          </a:xfrm>
+          <a:prstGeom prst="rect">
+            <a:avLst/>
+          </a:prstGeom>
+        </p:spPr>
+      </p:pic>
     </p:spTree>
     <p:extLst>
       <p:ext uri="{BB962C8B-B14F-4D97-AF65-F5344CB8AC3E}">

</xml_diff>